<commit_message>
Require consent for website
</commit_message>
<xml_diff>
--- a/docs/presentation.pptx
+++ b/docs/presentation.pptx
@@ -13,6 +13,7 @@
     <p:sldId id="261" r:id="rId7"/>
     <p:sldId id="262" r:id="rId8"/>
     <p:sldId id="263" r:id="rId9"/>
+    <p:sldId id="264" r:id="rId10"/>
   </p:sldIdLst>
   <p:sldSz cx="12192000" cy="6858000"/>
   <p:notesSz cx="6858000" cy="9144000"/>
@@ -4814,10 +4815,26 @@
               <a:rPr lang="da-DK" dirty="0" err="1"/>
               <a:t>place</a:t>
             </a:r>
-            <a:endParaRPr lang="da-DK"/>
-          </a:p>
-          <a:p>
             <a:endParaRPr lang="da-DK" dirty="0"/>
+          </a:p>
+          <a:p>
+            <a:pPr lvl="1"/>
+            <a:r>
+              <a:rPr lang="da-DK" dirty="0" err="1"/>
+              <a:t>Less</a:t>
+            </a:r>
+            <a:r>
+              <a:rPr lang="da-DK" dirty="0"/>
+              <a:t> </a:t>
+            </a:r>
+            <a:r>
+              <a:rPr lang="da-DK" dirty="0" err="1"/>
+              <a:t>implementation</a:t>
+            </a:r>
+            <a:r>
+              <a:rPr lang="da-DK" dirty="0"/>
+              <a:t> </a:t>
+            </a:r>
           </a:p>
         </p:txBody>
       </p:sp>
@@ -4825,6 +4842,244 @@
     <p:extLst>
       <p:ext uri="{BB962C8B-B14F-4D97-AF65-F5344CB8AC3E}">
         <p14:creationId xmlns:p14="http://schemas.microsoft.com/office/powerpoint/2010/main" val="1416516261"/>
+      </p:ext>
+    </p:extLst>
+  </p:cSld>
+  <p:clrMapOvr>
+    <a:masterClrMapping/>
+  </p:clrMapOvr>
+</p:sld>
+</file>
+
+<file path=ppt/slides/slide9.xml><?xml version="1.0" encoding="utf-8"?>
+<p:sld xmlns:a="http://schemas.openxmlformats.org/drawingml/2006/main" xmlns:r="http://schemas.openxmlformats.org/officeDocument/2006/relationships" xmlns:p="http://schemas.openxmlformats.org/presentationml/2006/main">
+  <p:cSld>
+    <p:spTree>
+      <p:nvGrpSpPr>
+        <p:cNvPr id="1" name=""/>
+        <p:cNvGrpSpPr/>
+        <p:nvPr/>
+      </p:nvGrpSpPr>
+      <p:grpSpPr>
+        <a:xfrm>
+          <a:off x="0" y="0"/>
+          <a:ext cx="0" cy="0"/>
+          <a:chOff x="0" y="0"/>
+          <a:chExt cx="0" cy="0"/>
+        </a:xfrm>
+      </p:grpSpPr>
+      <p:sp>
+        <p:nvSpPr>
+          <p:cNvPr id="2" name="Title 1">
+            <a:extLst>
+              <a:ext uri="{FF2B5EF4-FFF2-40B4-BE49-F238E27FC236}">
+                <a16:creationId xmlns:a16="http://schemas.microsoft.com/office/drawing/2014/main" id="{4E0F19DD-509A-41A3-A177-65DC0148A21C}"/>
+              </a:ext>
+            </a:extLst>
+          </p:cNvPr>
+          <p:cNvSpPr>
+            <a:spLocks noGrp="1"/>
+          </p:cNvSpPr>
+          <p:nvPr>
+            <p:ph type="title"/>
+          </p:nvPr>
+        </p:nvSpPr>
+        <p:spPr/>
+        <p:txBody>
+          <a:bodyPr/>
+          <a:lstStyle/>
+          <a:p>
+            <a:r>
+              <a:rPr lang="da-DK" dirty="0" err="1"/>
+              <a:t>Libs</a:t>
+            </a:r>
+            <a:r>
+              <a:rPr lang="da-DK" dirty="0"/>
+              <a:t> I like</a:t>
+            </a:r>
+          </a:p>
+        </p:txBody>
+      </p:sp>
+      <p:sp>
+        <p:nvSpPr>
+          <p:cNvPr id="3" name="Content Placeholder 2">
+            <a:extLst>
+              <a:ext uri="{FF2B5EF4-FFF2-40B4-BE49-F238E27FC236}">
+                <a16:creationId xmlns:a16="http://schemas.microsoft.com/office/drawing/2014/main" id="{6DEB09BF-61F3-4613-A4F5-E0F046D39FCB}"/>
+              </a:ext>
+            </a:extLst>
+          </p:cNvPr>
+          <p:cNvSpPr>
+            <a:spLocks noGrp="1"/>
+          </p:cNvSpPr>
+          <p:nvPr>
+            <p:ph idx="1"/>
+          </p:nvPr>
+        </p:nvSpPr>
+        <p:spPr/>
+        <p:txBody>
+          <a:bodyPr/>
+          <a:lstStyle/>
+          <a:p>
+            <a:r>
+              <a:rPr lang="da-DK" dirty="0"/>
+              <a:t>Not </a:t>
+            </a:r>
+            <a:r>
+              <a:rPr lang="da-DK" dirty="0" err="1"/>
+              <a:t>that</a:t>
+            </a:r>
+            <a:r>
+              <a:rPr lang="da-DK" dirty="0"/>
+              <a:t> </a:t>
+            </a:r>
+            <a:r>
+              <a:rPr lang="da-DK" dirty="0" err="1"/>
+              <a:t>many</a:t>
+            </a:r>
+            <a:r>
+              <a:rPr lang="da-DK" dirty="0"/>
+              <a:t> – </a:t>
+            </a:r>
+            <a:r>
+              <a:rPr lang="da-DK" dirty="0" err="1"/>
+              <a:t>its</a:t>
+            </a:r>
+            <a:r>
+              <a:rPr lang="da-DK" dirty="0"/>
+              <a:t> </a:t>
+            </a:r>
+            <a:r>
+              <a:rPr lang="da-DK" dirty="0" err="1"/>
+              <a:t>probably</a:t>
+            </a:r>
+            <a:r>
+              <a:rPr lang="da-DK"/>
+              <a:t> me</a:t>
+            </a:r>
+            <a:r>
+              <a:rPr lang="da-DK" dirty="0">
+                <a:sym typeface="Wingdings" panose="05000000000000000000" pitchFamily="2" charset="2"/>
+              </a:rPr>
+              <a:t>:(</a:t>
+            </a:r>
+          </a:p>
+          <a:p>
+            <a:r>
+              <a:rPr lang="da-DK" dirty="0">
+                <a:sym typeface="Wingdings" panose="05000000000000000000" pitchFamily="2" charset="2"/>
+              </a:rPr>
+              <a:t>All have </a:t>
+            </a:r>
+            <a:r>
+              <a:rPr lang="da-DK" dirty="0" err="1">
+                <a:sym typeface="Wingdings" panose="05000000000000000000" pitchFamily="2" charset="2"/>
+              </a:rPr>
+              <a:t>their</a:t>
+            </a:r>
+            <a:r>
+              <a:rPr lang="da-DK" dirty="0">
+                <a:sym typeface="Wingdings" panose="05000000000000000000" pitchFamily="2" charset="2"/>
+              </a:rPr>
+              <a:t> </a:t>
+            </a:r>
+            <a:r>
+              <a:rPr lang="da-DK" dirty="0" err="1">
+                <a:sym typeface="Wingdings" panose="05000000000000000000" pitchFamily="2" charset="2"/>
+              </a:rPr>
+              <a:t>idiosynchrasies</a:t>
+            </a:r>
+            <a:endParaRPr lang="da-DK" dirty="0">
+              <a:sym typeface="Wingdings" panose="05000000000000000000" pitchFamily="2" charset="2"/>
+            </a:endParaRPr>
+          </a:p>
+          <a:p>
+            <a:pPr lvl="1"/>
+            <a:r>
+              <a:rPr lang="da-DK" dirty="0" err="1">
+                <a:sym typeface="Wingdings" panose="05000000000000000000" pitchFamily="2" charset="2"/>
+              </a:rPr>
+              <a:t>Used</a:t>
+            </a:r>
+            <a:r>
+              <a:rPr lang="da-DK" dirty="0">
+                <a:sym typeface="Wingdings" panose="05000000000000000000" pitchFamily="2" charset="2"/>
+              </a:rPr>
+              <a:t> </a:t>
+            </a:r>
+            <a:r>
+              <a:rPr lang="da-DK" dirty="0" err="1">
+                <a:sym typeface="Wingdings" panose="05000000000000000000" pitchFamily="2" charset="2"/>
+              </a:rPr>
+              <a:t>Microsoft.AspNetCore.Authentication.OpenIdConnect</a:t>
+            </a:r>
+            <a:r>
+              <a:rPr lang="da-DK" dirty="0">
+                <a:sym typeface="Wingdings" panose="05000000000000000000" pitchFamily="2" charset="2"/>
+              </a:rPr>
+              <a:t> </a:t>
+            </a:r>
+            <a:r>
+              <a:rPr lang="da-DK" dirty="0" err="1">
+                <a:sym typeface="Wingdings" panose="05000000000000000000" pitchFamily="2" charset="2"/>
+              </a:rPr>
+              <a:t>which</a:t>
+            </a:r>
+            <a:r>
+              <a:rPr lang="da-DK" dirty="0">
+                <a:sym typeface="Wingdings" panose="05000000000000000000" pitchFamily="2" charset="2"/>
+              </a:rPr>
+              <a:t> </a:t>
+            </a:r>
+            <a:r>
+              <a:rPr lang="da-DK" dirty="0" err="1">
+                <a:sym typeface="Wingdings" panose="05000000000000000000" pitchFamily="2" charset="2"/>
+              </a:rPr>
+              <a:t>apparantly</a:t>
+            </a:r>
+            <a:r>
+              <a:rPr lang="da-DK" dirty="0">
+                <a:sym typeface="Wingdings" panose="05000000000000000000" pitchFamily="2" charset="2"/>
+              </a:rPr>
+              <a:t> </a:t>
+            </a:r>
+            <a:r>
+              <a:rPr lang="da-DK" dirty="0" err="1">
+                <a:sym typeface="Wingdings" panose="05000000000000000000" pitchFamily="2" charset="2"/>
+              </a:rPr>
+              <a:t>only</a:t>
+            </a:r>
+            <a:r>
+              <a:rPr lang="da-DK" dirty="0">
+                <a:sym typeface="Wingdings" panose="05000000000000000000" pitchFamily="2" charset="2"/>
+              </a:rPr>
+              <a:t> supports PKCE in pure ”</a:t>
+            </a:r>
+            <a:r>
+              <a:rPr lang="da-DK" dirty="0" err="1">
+                <a:sym typeface="Wingdings" panose="05000000000000000000" pitchFamily="2" charset="2"/>
+              </a:rPr>
+              <a:t>code</a:t>
+            </a:r>
+            <a:r>
+              <a:rPr lang="da-DK" dirty="0">
+                <a:sym typeface="Wingdings" panose="05000000000000000000" pitchFamily="2" charset="2"/>
+              </a:rPr>
+              <a:t>” mode. </a:t>
+            </a:r>
+          </a:p>
+          <a:p>
+            <a:pPr lvl="1"/>
+            <a:endParaRPr lang="da-DK" dirty="0">
+              <a:sym typeface="Wingdings" panose="05000000000000000000" pitchFamily="2" charset="2"/>
+            </a:endParaRPr>
+          </a:p>
+        </p:txBody>
+      </p:sp>
+    </p:spTree>
+    <p:extLst>
+      <p:ext uri="{BB962C8B-B14F-4D97-AF65-F5344CB8AC3E}">
+        <p14:creationId xmlns:p14="http://schemas.microsoft.com/office/powerpoint/2010/main" val="2111284336"/>
       </p:ext>
     </p:extLst>
   </p:cSld>

</xml_diff>